<commit_message>
Added email to presentation
</commit_message>
<xml_diff>
--- a/presentation/Reactive Programming with Pivotal's Reactor.pptx
+++ b/presentation/Reactive Programming with Pivotal's Reactor.pptx
@@ -149,6 +149,10 @@
     </p:ext>
   </p:extLst>
 </p:presentation>
+</file>
+
+<file path=ppt/revisionInfo.xml><?xml version="1.0" encoding="utf-8"?>
+<p1510:revInfo xmlns:a="http://schemas.openxmlformats.org/drawingml/2006/main" xmlns:r="http://schemas.openxmlformats.org/officeDocument/2006/relationships" xmlns:p1510="http://schemas.microsoft.com/office/powerpoint/2015/10/main"/>
 </file>
 
 <file path=ppt/notesMasters/notesMaster1.xml><?xml version="1.0" encoding="utf-8"?>
@@ -4451,8 +4455,8 @@
         </p:nvSpPr>
         <p:spPr>
           <a:xfrm>
-            <a:off x="184149" y="5561188"/>
-            <a:ext cx="1816102" cy="461665"/>
+            <a:off x="528129" y="5593272"/>
+            <a:ext cx="2924849" cy="1200329"/>
           </a:xfrm>
           <a:prstGeom prst="rect">
             <a:avLst/>
@@ -4468,6 +4472,12 @@
             <a:r>
               <a:rPr lang="en-US" sz="2400" dirty="0"/>
               <a:t>Victor Grazi</a:t>
+            </a:r>
+          </a:p>
+          <a:p>
+            <a:r>
+              <a:rPr lang="en-US" sz="2400" dirty="0"/>
+              <a:t>vgrazi@gmail.com</a:t>
             </a:r>
           </a:p>
         </p:txBody>

</xml_diff>

<commit_message>
Moved to junit 5
</commit_message>
<xml_diff>
--- a/presentation/Reactive Programming with Pivotal's Reactor.pptx
+++ b/presentation/Reactive Programming with Pivotal's Reactor.pptx
@@ -237,7 +237,7 @@
           <a:p>
             <a:fld id="{DBBF626D-7C02-CB49-8108-FEADD179020D}" type="datetimeFigureOut">
               <a:rPr lang="en-US" smtClean="0"/>
-              <a:t>6/18/2017</a:t>
+              <a:t>6/20/2017</a:t>
             </a:fld>
             <a:endParaRPr lang="en-US"/>
           </a:p>
@@ -727,7 +727,7 @@
           <a:bodyPr/>
           <a:lstStyle/>
           <a:p>
-            <a:endParaRPr lang="en-US"/>
+            <a:endParaRPr lang="en-US" dirty="0"/>
           </a:p>
         </p:txBody>
       </p:sp>
@@ -1660,7 +1660,7 @@
           <a:p>
             <a:fld id="{8FF9FA9A-13A0-B941-9A71-6762CF019508}" type="datetime1">
               <a:rPr lang="en-US" smtClean="0"/>
-              <a:t>6/18/2017</a:t>
+              <a:t>6/20/2017</a:t>
             </a:fld>
             <a:endParaRPr lang="en-US"/>
           </a:p>
@@ -1833,7 +1833,7 @@
           <a:p>
             <a:fld id="{867DB3F8-3B97-4B4B-9522-780495115794}" type="datetime1">
               <a:rPr lang="en-US" smtClean="0"/>
-              <a:t>6/18/2017</a:t>
+              <a:t>6/20/2017</a:t>
             </a:fld>
             <a:endParaRPr lang="en-US"/>
           </a:p>
@@ -2011,7 +2011,7 @@
           <a:p>
             <a:fld id="{88691AD2-CC3C-AB4E-9DD0-2D374DB278B2}" type="datetime1">
               <a:rPr lang="en-US" smtClean="0"/>
-              <a:t>6/18/2017</a:t>
+              <a:t>6/20/2017</a:t>
             </a:fld>
             <a:endParaRPr lang="en-US"/>
           </a:p>
@@ -2179,7 +2179,7 @@
           <a:p>
             <a:fld id="{829918D9-B6C3-3746-89BE-BFCFED89B19F}" type="datetime1">
               <a:rPr lang="en-US" smtClean="0"/>
-              <a:t>6/18/2017</a:t>
+              <a:t>6/20/2017</a:t>
             </a:fld>
             <a:endParaRPr lang="en-US"/>
           </a:p>
@@ -2424,7 +2424,7 @@
           <a:p>
             <a:fld id="{32A2D6CD-FC21-A946-B18E-BC0A636C75D1}" type="datetime1">
               <a:rPr lang="en-US" smtClean="0"/>
-              <a:t>6/18/2017</a:t>
+              <a:t>6/20/2017</a:t>
             </a:fld>
             <a:endParaRPr lang="en-US"/>
           </a:p>
@@ -2653,7 +2653,7 @@
           <a:p>
             <a:fld id="{19C9E323-52AF-904E-9C48-03950BD39B3C}" type="datetime1">
               <a:rPr lang="en-US" smtClean="0"/>
-              <a:t>6/18/2017</a:t>
+              <a:t>6/20/2017</a:t>
             </a:fld>
             <a:endParaRPr lang="en-US"/>
           </a:p>
@@ -3022,7 +3022,7 @@
           <a:p>
             <a:fld id="{8088F6CF-0211-6549-8814-91D841176D36}" type="datetime1">
               <a:rPr lang="en-US" smtClean="0"/>
-              <a:t>6/18/2017</a:t>
+              <a:t>6/20/2017</a:t>
             </a:fld>
             <a:endParaRPr lang="en-US"/>
           </a:p>
@@ -3144,7 +3144,7 @@
           <a:p>
             <a:fld id="{373101B8-E1AD-034B-989D-6F1B80F287C9}" type="datetime1">
               <a:rPr lang="en-US" smtClean="0"/>
-              <a:t>6/18/2017</a:t>
+              <a:t>6/20/2017</a:t>
             </a:fld>
             <a:endParaRPr lang="en-US"/>
           </a:p>
@@ -3239,7 +3239,7 @@
           <a:p>
             <a:fld id="{4D5A1C54-C643-6049-AD68-A2E2F106A239}" type="datetime1">
               <a:rPr lang="en-US" smtClean="0"/>
-              <a:t>6/18/2017</a:t>
+              <a:t>6/20/2017</a:t>
             </a:fld>
             <a:endParaRPr lang="en-US"/>
           </a:p>
@@ -3519,7 +3519,7 @@
           <a:p>
             <a:fld id="{2F226CC8-A07C-804E-B8C9-7BF9EA8A7EFF}" type="datetime1">
               <a:rPr lang="en-US" smtClean="0"/>
-              <a:t>6/18/2017</a:t>
+              <a:t>6/20/2017</a:t>
             </a:fld>
             <a:endParaRPr lang="en-US"/>
           </a:p>
@@ -3776,7 +3776,7 @@
           <a:p>
             <a:fld id="{40CA37B8-9C47-374F-96CB-834E9EADCDC9}" type="datetime1">
               <a:rPr lang="en-US" smtClean="0"/>
-              <a:t>6/18/2017</a:t>
+              <a:t>6/20/2017</a:t>
             </a:fld>
             <a:endParaRPr lang="en-US"/>
           </a:p>
@@ -3987,7 +3987,7 @@
           <a:p>
             <a:fld id="{51D7010B-42F9-EB4C-AAD1-CD01987F5A7D}" type="datetime1">
               <a:rPr lang="en-US" smtClean="0"/>
-              <a:t>6/18/2017</a:t>
+              <a:t>6/20/2017</a:t>
             </a:fld>
             <a:endParaRPr lang="en-US"/>
           </a:p>
@@ -4429,8 +4429,8 @@
         </p:blipFill>
         <p:spPr bwMode="auto">
           <a:xfrm>
-            <a:off x="2382957" y="333994"/>
-            <a:ext cx="7078402" cy="4258277"/>
+            <a:off x="2235041" y="333994"/>
+            <a:ext cx="6567225" cy="3950759"/>
           </a:xfrm>
           <a:prstGeom prst="rect">
             <a:avLst/>
@@ -4455,8 +4455,8 @@
         </p:nvSpPr>
         <p:spPr>
           <a:xfrm>
-            <a:off x="2740789" y="5506804"/>
-            <a:ext cx="6274873" cy="1200329"/>
+            <a:off x="2637916" y="5073669"/>
+            <a:ext cx="5761474" cy="1569660"/>
           </a:xfrm>
           <a:prstGeom prst="rect">
             <a:avLst/>
@@ -4477,7 +4477,22 @@
             <a:pPr lvl="1"/>
             <a:r>
               <a:rPr lang="en-US" sz="2400" dirty="0"/>
-              <a:t>by Victor Grazi</a:t>
+              <a:t>by Victor Grazi </a:t>
+            </a:r>
+          </a:p>
+          <a:p>
+            <a:pPr lvl="1"/>
+            <a:r>
+              <a:rPr lang="en-US" sz="2400" dirty="0"/>
+              <a:t>twitter: @</a:t>
+            </a:r>
+            <a:r>
+              <a:rPr lang="en-US" sz="2400" dirty="0" err="1"/>
+              <a:t>vgrazi</a:t>
+            </a:r>
+            <a:r>
+              <a:rPr lang="en-US" sz="2400" dirty="0"/>
+              <a:t> </a:t>
             </a:r>
           </a:p>
           <a:p>
@@ -4514,8 +4529,8 @@
         </p:nvSpPr>
         <p:spPr>
           <a:xfrm>
-            <a:off x="1350157" y="4730647"/>
-            <a:ext cx="9144001" cy="702205"/>
+            <a:off x="1276826" y="4297513"/>
+            <a:ext cx="8483654" cy="274490"/>
           </a:xfrm>
         </p:spPr>
         <p:txBody>
@@ -4525,7 +4540,7 @@
           <a:lstStyle/>
           <a:p>
             <a:r>
-              <a:rPr lang="en-US" sz="4000" dirty="0"/>
+              <a:rPr lang="en-US" sz="3600" dirty="0"/>
               <a:t>Introduction to Pivotal Reactor</a:t>
             </a:r>
           </a:p>
@@ -4543,8 +4558,8 @@
         </p:nvSpPr>
         <p:spPr>
           <a:xfrm>
-            <a:off x="334717" y="2448856"/>
-            <a:ext cx="11174882" cy="836839"/>
+            <a:off x="334717" y="2545109"/>
+            <a:ext cx="10367872" cy="327118"/>
           </a:xfrm>
           <a:solidFill>
             <a:schemeClr val="bg1"/>
@@ -4552,12 +4567,12 @@
         </p:spPr>
         <p:txBody>
           <a:bodyPr>
-            <a:normAutofit/>
+            <a:noAutofit/>
           </a:bodyPr>
           <a:lstStyle/>
           <a:p>
             <a:r>
-              <a:rPr lang="en-US" sz="4000" b="1" u="sng" dirty="0">
+              <a:rPr lang="en-US" sz="3200" b="1" u="sng" dirty="0">
                 <a:solidFill>
                   <a:schemeClr val="accent5"/>
                 </a:solidFill>
@@ -10324,7 +10339,7 @@
           <a:p>
             <a:r>
               <a:rPr lang="en-US" sz="4000" dirty="0"/>
-              <a:t>Concurrency</a:t>
+              <a:t>Concurrency footnote</a:t>
             </a:r>
           </a:p>
         </p:txBody>
@@ -12515,41 +12530,6 @@
           </a:p>
         </p:txBody>
       </p:sp>
-      <p:sp>
-        <p:nvSpPr>
-          <p:cNvPr id="5" name="TextBox 4"/>
-          <p:cNvSpPr txBox="1"/>
-          <p:nvPr/>
-        </p:nvSpPr>
-        <p:spPr>
-          <a:xfrm>
-            <a:off x="474133" y="5339644"/>
-            <a:ext cx="3217334" cy="830997"/>
-          </a:xfrm>
-          <a:prstGeom prst="rect">
-            <a:avLst/>
-          </a:prstGeom>
-          <a:noFill/>
-        </p:spPr>
-        <p:txBody>
-          <a:bodyPr wrap="square" rtlCol="0">
-            <a:spAutoFit/>
-          </a:bodyPr>
-          <a:lstStyle/>
-          <a:p>
-            <a:r>
-              <a:rPr lang="en-US" sz="2400" dirty="0"/>
-              <a:t>Victor Grazi</a:t>
-            </a:r>
-          </a:p>
-          <a:p>
-            <a:r>
-              <a:rPr lang="en-US" sz="2400" dirty="0"/>
-              <a:t>GMIT Core IT</a:t>
-            </a:r>
-          </a:p>
-        </p:txBody>
-      </p:sp>
       <p:grpSp>
         <p:nvGrpSpPr>
           <p:cNvPr id="10" name="Group 9"/>
@@ -12686,6 +12666,80 @@
           </a:p>
         </p:txBody>
       </p:sp>
+      <p:sp>
+        <p:nvSpPr>
+          <p:cNvPr id="11" name="TextBox 10">
+            <a:extLst>
+              <a:ext uri="{FF2B5EF4-FFF2-40B4-BE49-F238E27FC236}">
+                <a16:creationId xmlns:a16="http://schemas.microsoft.com/office/drawing/2014/main" id="{35390FF8-9B53-4821-A257-BEA5A9448A82}"/>
+              </a:ext>
+            </a:extLst>
+          </p:cNvPr>
+          <p:cNvSpPr txBox="1"/>
+          <p:nvPr/>
+        </p:nvSpPr>
+        <p:spPr>
+          <a:xfrm>
+            <a:off x="-345917" y="5169921"/>
+            <a:ext cx="5761474" cy="1569660"/>
+          </a:xfrm>
+          <a:prstGeom prst="rect">
+            <a:avLst/>
+          </a:prstGeom>
+          <a:noFill/>
+          <a:ln>
+            <a:noFill/>
+          </a:ln>
+        </p:spPr>
+        <p:txBody>
+          <a:bodyPr wrap="square" rtlCol="0">
+            <a:spAutoFit/>
+          </a:bodyPr>
+          <a:lstStyle/>
+          <a:p>
+            <a:pPr lvl="1"/>
+            <a:r>
+              <a:rPr lang="en-US" sz="2400" dirty="0"/>
+              <a:t>by Victor Grazi </a:t>
+            </a:r>
+          </a:p>
+          <a:p>
+            <a:pPr lvl="1"/>
+            <a:r>
+              <a:rPr lang="en-US" sz="2400" dirty="0"/>
+              <a:t>twitter: @</a:t>
+            </a:r>
+            <a:r>
+              <a:rPr lang="en-US" sz="2400" dirty="0" err="1"/>
+              <a:t>vgrazi</a:t>
+            </a:r>
+            <a:r>
+              <a:rPr lang="en-US" sz="2400" dirty="0"/>
+              <a:t> </a:t>
+            </a:r>
+          </a:p>
+          <a:p>
+            <a:pPr lvl="1"/>
+            <a:r>
+              <a:rPr lang="en-US" sz="2400" dirty="0">
+                <a:hlinkClick r:id="rId4"/>
+              </a:rPr>
+              <a:t>vgrazi@gmail.com</a:t>
+            </a:r>
+            <a:endParaRPr lang="en-US" sz="2400" dirty="0"/>
+          </a:p>
+          <a:p>
+            <a:pPr lvl="1"/>
+            <a:r>
+              <a:rPr lang="en-US" sz="2400" dirty="0">
+                <a:hlinkClick r:id="rId5"/>
+              </a:rPr>
+              <a:t>https://github.com/vgrazi/reactive-demo</a:t>
+            </a:r>
+            <a:endParaRPr lang="en-US" sz="2400" dirty="0"/>
+          </a:p>
+        </p:txBody>
+      </p:sp>
     </p:spTree>
     <p:extLst>
       <p:ext uri="{BB962C8B-B14F-4D97-AF65-F5344CB8AC3E}">
@@ -12759,41 +12813,6 @@
       </p:pic>
       <p:sp>
         <p:nvSpPr>
-          <p:cNvPr id="5" name="TextBox 4"/>
-          <p:cNvSpPr txBox="1"/>
-          <p:nvPr/>
-        </p:nvSpPr>
-        <p:spPr>
-          <a:xfrm>
-            <a:off x="474133" y="5339644"/>
-            <a:ext cx="3217334" cy="830997"/>
-          </a:xfrm>
-          <a:prstGeom prst="rect">
-            <a:avLst/>
-          </a:prstGeom>
-          <a:noFill/>
-        </p:spPr>
-        <p:txBody>
-          <a:bodyPr wrap="square" rtlCol="0">
-            <a:spAutoFit/>
-          </a:bodyPr>
-          <a:lstStyle/>
-          <a:p>
-            <a:r>
-              <a:rPr lang="en-US" sz="2400" dirty="0"/>
-              <a:t>Victor Grazi</a:t>
-            </a:r>
-          </a:p>
-          <a:p>
-            <a:r>
-              <a:rPr lang="en-US" sz="2400" dirty="0"/>
-              <a:t>GMIT Core IT</a:t>
-            </a:r>
-          </a:p>
-        </p:txBody>
-      </p:sp>
-      <p:sp>
-        <p:nvSpPr>
           <p:cNvPr id="14" name="TextBox 13"/>
           <p:cNvSpPr txBox="1"/>
           <p:nvPr/>
@@ -12856,41 +12875,6 @@
             <a:r>
               <a:rPr lang="en-US" sz="4400" dirty="0"/>
               <a:t> Reactor</a:t>
-            </a:r>
-          </a:p>
-        </p:txBody>
-      </p:sp>
-      <p:sp>
-        <p:nvSpPr>
-          <p:cNvPr id="17" name="TextBox 16"/>
-          <p:cNvSpPr txBox="1"/>
-          <p:nvPr/>
-        </p:nvSpPr>
-        <p:spPr>
-          <a:xfrm>
-            <a:off x="474133" y="5339644"/>
-            <a:ext cx="3217334" cy="830997"/>
-          </a:xfrm>
-          <a:prstGeom prst="rect">
-            <a:avLst/>
-          </a:prstGeom>
-          <a:noFill/>
-        </p:spPr>
-        <p:txBody>
-          <a:bodyPr wrap="square" rtlCol="0">
-            <a:spAutoFit/>
-          </a:bodyPr>
-          <a:lstStyle/>
-          <a:p>
-            <a:r>
-              <a:rPr lang="en-US" sz="2400" dirty="0"/>
-              <a:t>Victor Grazi</a:t>
-            </a:r>
-          </a:p>
-          <a:p>
-            <a:r>
-              <a:rPr lang="en-US" sz="2400" dirty="0"/>
-              <a:t>GMIT Core IT</a:t>
             </a:r>
           </a:p>
         </p:txBody>
@@ -13213,6 +13197,82 @@
               <a:rPr lang="en-US" sz="4400" dirty="0"/>
               <a:t>?</a:t>
             </a:r>
+          </a:p>
+        </p:txBody>
+      </p:sp>
+      <p:sp>
+        <p:nvSpPr>
+          <p:cNvPr id="15" name="TextBox 14">
+            <a:extLst>
+              <a:ext uri="{FF2B5EF4-FFF2-40B4-BE49-F238E27FC236}">
+                <a16:creationId xmlns:a16="http://schemas.microsoft.com/office/drawing/2014/main" id="{19A02797-C01E-4F60-98BF-678888C7D87D}"/>
+              </a:ext>
+            </a:extLst>
+          </p:cNvPr>
+          <p:cNvSpPr txBox="1"/>
+          <p:nvPr/>
+        </p:nvSpPr>
+        <p:spPr>
+          <a:xfrm>
+            <a:off x="612541" y="4873410"/>
+            <a:ext cx="5761474" cy="1569660"/>
+          </a:xfrm>
+          <a:prstGeom prst="rect">
+            <a:avLst/>
+          </a:prstGeom>
+          <a:noFill/>
+          <a:ln>
+            <a:solidFill>
+              <a:schemeClr val="accent1"/>
+            </a:solidFill>
+          </a:ln>
+        </p:spPr>
+        <p:txBody>
+          <a:bodyPr wrap="square" rtlCol="0">
+            <a:spAutoFit/>
+          </a:bodyPr>
+          <a:lstStyle/>
+          <a:p>
+            <a:pPr lvl="1"/>
+            <a:r>
+              <a:rPr lang="en-US" sz="2400" dirty="0"/>
+              <a:t>by Victor Grazi </a:t>
+            </a:r>
+          </a:p>
+          <a:p>
+            <a:pPr lvl="1"/>
+            <a:r>
+              <a:rPr lang="en-US" sz="2400" dirty="0"/>
+              <a:t>twitter: @</a:t>
+            </a:r>
+            <a:r>
+              <a:rPr lang="en-US" sz="2400" dirty="0" err="1"/>
+              <a:t>vgrazi</a:t>
+            </a:r>
+            <a:r>
+              <a:rPr lang="en-US" sz="2400" dirty="0"/>
+              <a:t> </a:t>
+            </a:r>
+          </a:p>
+          <a:p>
+            <a:pPr lvl="1"/>
+            <a:r>
+              <a:rPr lang="en-US" sz="2400" dirty="0">
+                <a:hlinkClick r:id="rId4"/>
+              </a:rPr>
+              <a:t>vgrazi@gmail.com</a:t>
+            </a:r>
+            <a:endParaRPr lang="en-US" sz="2400" dirty="0"/>
+          </a:p>
+          <a:p>
+            <a:pPr lvl="1"/>
+            <a:r>
+              <a:rPr lang="en-US" sz="2400" dirty="0">
+                <a:hlinkClick r:id="rId5"/>
+              </a:rPr>
+              <a:t>https://github.com/vgrazi/reactive-demo</a:t>
+            </a:r>
+            <a:endParaRPr lang="en-US" sz="2400" dirty="0"/>
           </a:p>
         </p:txBody>
       </p:sp>

</xml_diff>